<commit_message>
Clouster erp software diagram
</commit_message>
<xml_diff>
--- a/Clouster Erp.pptx
+++ b/Clouster Erp.pptx
@@ -10751,7 +10751,7 @@
           <a:p>
             <a:r>
               <a:rPr lang="en-US" dirty="0"/>
-              <a:t>MODULE: SOFTARE CONFIGURATION</a:t>
+              <a:t>MODULE: SOFTWARE CONFIGURATION</a:t>
             </a:r>
           </a:p>
         </p:txBody>
@@ -14917,9 +14917,9 @@
         <p:grpSpPr>
           <a:xfrm>
             <a:off x="1406163" y="1944462"/>
-            <a:ext cx="9121125" cy="3464831"/>
+            <a:ext cx="9121125" cy="2588023"/>
             <a:chOff x="1406163" y="1944462"/>
-            <a:chExt cx="9121125" cy="3464831"/>
+            <a:chExt cx="9121125" cy="2588023"/>
           </a:xfrm>
         </p:grpSpPr>
         <p:sp>
@@ -15244,98 +15244,7 @@
             </a:fontRef>
           </p:style>
         </p:cxnSp>
-        <p:sp>
-          <p:nvSpPr>
-            <p:cNvPr id="25" name="Rectangle 24">
-              <a:extLst>
-                <a:ext uri="{FF2B5EF4-FFF2-40B4-BE49-F238E27FC236}">
-                  <a16:creationId xmlns:a16="http://schemas.microsoft.com/office/drawing/2014/main" id="{164730C7-3176-467E-AAD4-E440C1D30BBC}"/>
-                </a:ext>
-              </a:extLst>
-            </p:cNvPr>
-            <p:cNvSpPr/>
-            <p:nvPr/>
-          </p:nvSpPr>
-          <p:spPr>
-            <a:xfrm>
-              <a:off x="3050325" y="5108156"/>
-              <a:ext cx="2371217" cy="301137"/>
-            </a:xfrm>
-            <a:prstGeom prst="rect">
-              <a:avLst/>
-            </a:prstGeom>
-          </p:spPr>
-          <p:style>
-            <a:lnRef idx="2">
-              <a:schemeClr val="accent1">
-                <a:shade val="50000"/>
-              </a:schemeClr>
-            </a:lnRef>
-            <a:fillRef idx="1">
-              <a:schemeClr val="accent1"/>
-            </a:fillRef>
-            <a:effectRef idx="0">
-              <a:schemeClr val="accent1"/>
-            </a:effectRef>
-            <a:fontRef idx="minor">
-              <a:schemeClr val="lt1"/>
-            </a:fontRef>
-          </p:style>
-          <p:txBody>
-            <a:bodyPr rtlCol="0" anchor="ctr"/>
-            <a:lstStyle/>
-            <a:p>
-              <a:pPr algn="ctr"/>
-              <a:r>
-                <a:rPr lang="en-US" dirty="0"/>
-                <a:t>Stock Ledger</a:t>
-              </a:r>
-            </a:p>
-          </p:txBody>
-        </p:sp>
       </p:grpSp>
-      <p:cxnSp>
-        <p:nvCxnSpPr>
-          <p:cNvPr id="7" name="Straight Arrow Connector 6">
-            <a:extLst>
-              <a:ext uri="{FF2B5EF4-FFF2-40B4-BE49-F238E27FC236}">
-                <a16:creationId xmlns:a16="http://schemas.microsoft.com/office/drawing/2014/main" id="{03788D9C-BC66-4573-A7E8-A7EF77DFD70A}"/>
-              </a:ext>
-            </a:extLst>
-          </p:cNvPr>
-          <p:cNvCxnSpPr>
-            <a:stCxn id="35" idx="4"/>
-            <a:endCxn id="25" idx="0"/>
-          </p:cNvCxnSpPr>
-          <p:nvPr/>
-        </p:nvCxnSpPr>
-        <p:spPr>
-          <a:xfrm flipH="1">
-            <a:off x="4235934" y="2637645"/>
-            <a:ext cx="1739698" cy="2470511"/>
-          </a:xfrm>
-          <a:prstGeom prst="straightConnector1">
-            <a:avLst/>
-          </a:prstGeom>
-          <a:ln>
-            <a:tailEnd type="triangle"/>
-          </a:ln>
-        </p:spPr>
-        <p:style>
-          <a:lnRef idx="1">
-            <a:schemeClr val="accent1"/>
-          </a:lnRef>
-          <a:fillRef idx="0">
-            <a:schemeClr val="accent1"/>
-          </a:fillRef>
-          <a:effectRef idx="0">
-            <a:schemeClr val="accent1"/>
-          </a:effectRef>
-          <a:fontRef idx="minor">
-            <a:schemeClr val="tx1"/>
-          </a:fontRef>
-        </p:style>
-      </p:cxnSp>
     </p:spTree>
     <p:extLst>
       <p:ext uri="{BB962C8B-B14F-4D97-AF65-F5344CB8AC3E}">
@@ -17963,6 +17872,347 @@
           </p:style>
         </p:cxnSp>
       </p:grpSp>
+      <p:grpSp>
+        <p:nvGrpSpPr>
+          <p:cNvPr id="89" name="Group 88">
+            <a:extLst>
+              <a:ext uri="{FF2B5EF4-FFF2-40B4-BE49-F238E27FC236}">
+                <a16:creationId xmlns:a16="http://schemas.microsoft.com/office/drawing/2014/main" id="{B4486F5F-0E10-454E-B415-11BD0631ECE1}"/>
+              </a:ext>
+            </a:extLst>
+          </p:cNvPr>
+          <p:cNvGrpSpPr/>
+          <p:nvPr/>
+        </p:nvGrpSpPr>
+        <p:grpSpPr>
+          <a:xfrm>
+            <a:off x="4106961" y="4537388"/>
+            <a:ext cx="3742449" cy="1808753"/>
+            <a:chOff x="442605" y="1620247"/>
+            <a:chExt cx="4366787" cy="2110500"/>
+          </a:xfrm>
+        </p:grpSpPr>
+        <p:sp>
+          <p:nvSpPr>
+            <p:cNvPr id="90" name="Rectangle 89">
+              <a:extLst>
+                <a:ext uri="{FF2B5EF4-FFF2-40B4-BE49-F238E27FC236}">
+                  <a16:creationId xmlns:a16="http://schemas.microsoft.com/office/drawing/2014/main" id="{739A9F13-6AE9-479B-A32B-14E151AED9D9}"/>
+                </a:ext>
+              </a:extLst>
+            </p:cNvPr>
+            <p:cNvSpPr/>
+            <p:nvPr/>
+          </p:nvSpPr>
+          <p:spPr>
+            <a:xfrm>
+              <a:off x="442605" y="3379373"/>
+              <a:ext cx="1345830" cy="351374"/>
+            </a:xfrm>
+            <a:prstGeom prst="rect">
+              <a:avLst/>
+            </a:prstGeom>
+          </p:spPr>
+          <p:style>
+            <a:lnRef idx="2">
+              <a:schemeClr val="accent1">
+                <a:shade val="50000"/>
+              </a:schemeClr>
+            </a:lnRef>
+            <a:fillRef idx="1">
+              <a:schemeClr val="accent1"/>
+            </a:fillRef>
+            <a:effectRef idx="0">
+              <a:schemeClr val="accent1"/>
+            </a:effectRef>
+            <a:fontRef idx="minor">
+              <a:schemeClr val="lt1"/>
+            </a:fontRef>
+          </p:style>
+          <p:txBody>
+            <a:bodyPr rtlCol="0" anchor="ctr"/>
+            <a:lstStyle/>
+            <a:p>
+              <a:pPr algn="ctr"/>
+              <a:r>
+                <a:rPr lang="en-US" dirty="0"/>
+                <a:t>Create</a:t>
+              </a:r>
+            </a:p>
+          </p:txBody>
+        </p:sp>
+        <p:sp>
+          <p:nvSpPr>
+            <p:cNvPr id="91" name="Oval 90">
+              <a:extLst>
+                <a:ext uri="{FF2B5EF4-FFF2-40B4-BE49-F238E27FC236}">
+                  <a16:creationId xmlns:a16="http://schemas.microsoft.com/office/drawing/2014/main" id="{14E8C660-726C-4D4B-BAF8-443F90707994}"/>
+                </a:ext>
+              </a:extLst>
+            </p:cNvPr>
+            <p:cNvSpPr/>
+            <p:nvPr/>
+          </p:nvSpPr>
+          <p:spPr>
+            <a:xfrm>
+              <a:off x="1578115" y="1620247"/>
+              <a:ext cx="2058175" cy="808824"/>
+            </a:xfrm>
+            <a:prstGeom prst="ellipse">
+              <a:avLst/>
+            </a:prstGeom>
+          </p:spPr>
+          <p:style>
+            <a:lnRef idx="2">
+              <a:schemeClr val="accent1">
+                <a:shade val="50000"/>
+              </a:schemeClr>
+            </a:lnRef>
+            <a:fillRef idx="1">
+              <a:schemeClr val="accent1"/>
+            </a:fillRef>
+            <a:effectRef idx="0">
+              <a:schemeClr val="accent1"/>
+            </a:effectRef>
+            <a:fontRef idx="minor">
+              <a:schemeClr val="lt1"/>
+            </a:fontRef>
+          </p:style>
+          <p:txBody>
+            <a:bodyPr rtlCol="0" anchor="ctr"/>
+            <a:lstStyle/>
+            <a:p>
+              <a:pPr algn="ctr"/>
+              <a:r>
+                <a:rPr lang="en-US" dirty="0"/>
+                <a:t>Journal</a:t>
+              </a:r>
+            </a:p>
+          </p:txBody>
+        </p:sp>
+        <p:sp>
+          <p:nvSpPr>
+            <p:cNvPr id="92" name="Rectangle 91">
+              <a:extLst>
+                <a:ext uri="{FF2B5EF4-FFF2-40B4-BE49-F238E27FC236}">
+                  <a16:creationId xmlns:a16="http://schemas.microsoft.com/office/drawing/2014/main" id="{CC881189-7701-4881-AEC0-9B0EA3332BF5}"/>
+                </a:ext>
+              </a:extLst>
+            </p:cNvPr>
+            <p:cNvSpPr/>
+            <p:nvPr/>
+          </p:nvSpPr>
+          <p:spPr>
+            <a:xfrm>
+              <a:off x="1934289" y="3379373"/>
+              <a:ext cx="1345830" cy="351374"/>
+            </a:xfrm>
+            <a:prstGeom prst="rect">
+              <a:avLst/>
+            </a:prstGeom>
+          </p:spPr>
+          <p:style>
+            <a:lnRef idx="2">
+              <a:schemeClr val="accent1">
+                <a:shade val="50000"/>
+              </a:schemeClr>
+            </a:lnRef>
+            <a:fillRef idx="1">
+              <a:schemeClr val="accent1"/>
+            </a:fillRef>
+            <a:effectRef idx="0">
+              <a:schemeClr val="accent1"/>
+            </a:effectRef>
+            <a:fontRef idx="minor">
+              <a:schemeClr val="lt1"/>
+            </a:fontRef>
+          </p:style>
+          <p:txBody>
+            <a:bodyPr rtlCol="0" anchor="ctr"/>
+            <a:lstStyle/>
+            <a:p>
+              <a:pPr algn="ctr"/>
+              <a:r>
+                <a:rPr lang="en-US" dirty="0"/>
+                <a:t>Update</a:t>
+              </a:r>
+            </a:p>
+          </p:txBody>
+        </p:sp>
+        <p:sp>
+          <p:nvSpPr>
+            <p:cNvPr id="93" name="Rectangle 92">
+              <a:extLst>
+                <a:ext uri="{FF2B5EF4-FFF2-40B4-BE49-F238E27FC236}">
+                  <a16:creationId xmlns:a16="http://schemas.microsoft.com/office/drawing/2014/main" id="{B88021E8-5D57-441C-8E99-161F15E977AB}"/>
+                </a:ext>
+              </a:extLst>
+            </p:cNvPr>
+            <p:cNvSpPr/>
+            <p:nvPr/>
+          </p:nvSpPr>
+          <p:spPr>
+            <a:xfrm>
+              <a:off x="3463562" y="3379373"/>
+              <a:ext cx="1345830" cy="351374"/>
+            </a:xfrm>
+            <a:prstGeom prst="rect">
+              <a:avLst/>
+            </a:prstGeom>
+          </p:spPr>
+          <p:style>
+            <a:lnRef idx="2">
+              <a:schemeClr val="accent1">
+                <a:shade val="50000"/>
+              </a:schemeClr>
+            </a:lnRef>
+            <a:fillRef idx="1">
+              <a:schemeClr val="accent1"/>
+            </a:fillRef>
+            <a:effectRef idx="0">
+              <a:schemeClr val="accent1"/>
+            </a:effectRef>
+            <a:fontRef idx="minor">
+              <a:schemeClr val="lt1"/>
+            </a:fontRef>
+          </p:style>
+          <p:txBody>
+            <a:bodyPr rtlCol="0" anchor="ctr"/>
+            <a:lstStyle/>
+            <a:p>
+              <a:pPr algn="ctr"/>
+              <a:r>
+                <a:rPr lang="en-US" dirty="0"/>
+                <a:t>Delete</a:t>
+              </a:r>
+            </a:p>
+          </p:txBody>
+        </p:sp>
+        <p:cxnSp>
+          <p:nvCxnSpPr>
+            <p:cNvPr id="94" name="Straight Arrow Connector 93">
+              <a:extLst>
+                <a:ext uri="{FF2B5EF4-FFF2-40B4-BE49-F238E27FC236}">
+                  <a16:creationId xmlns:a16="http://schemas.microsoft.com/office/drawing/2014/main" id="{10016873-56A9-4F35-B865-B7AA78D8913D}"/>
+                </a:ext>
+              </a:extLst>
+            </p:cNvPr>
+            <p:cNvCxnSpPr>
+              <a:cxnSpLocks/>
+              <a:stCxn id="91" idx="4"/>
+            </p:cNvCxnSpPr>
+            <p:nvPr/>
+          </p:nvCxnSpPr>
+          <p:spPr>
+            <a:xfrm flipH="1">
+              <a:off x="988029" y="2429071"/>
+              <a:ext cx="1619174" cy="950302"/>
+            </a:xfrm>
+            <a:prstGeom prst="straightConnector1">
+              <a:avLst/>
+            </a:prstGeom>
+            <a:ln>
+              <a:tailEnd type="triangle"/>
+            </a:ln>
+          </p:spPr>
+          <p:style>
+            <a:lnRef idx="1">
+              <a:schemeClr val="accent1"/>
+            </a:lnRef>
+            <a:fillRef idx="0">
+              <a:schemeClr val="accent1"/>
+            </a:fillRef>
+            <a:effectRef idx="0">
+              <a:schemeClr val="accent1"/>
+            </a:effectRef>
+            <a:fontRef idx="minor">
+              <a:schemeClr val="tx1"/>
+            </a:fontRef>
+          </p:style>
+        </p:cxnSp>
+        <p:cxnSp>
+          <p:nvCxnSpPr>
+            <p:cNvPr id="95" name="Straight Arrow Connector 94">
+              <a:extLst>
+                <a:ext uri="{FF2B5EF4-FFF2-40B4-BE49-F238E27FC236}">
+                  <a16:creationId xmlns:a16="http://schemas.microsoft.com/office/drawing/2014/main" id="{E2F9E8F8-08F4-4B00-A2BA-F0478D22B3CB}"/>
+                </a:ext>
+              </a:extLst>
+            </p:cNvPr>
+            <p:cNvCxnSpPr>
+              <a:endCxn id="92" idx="0"/>
+            </p:cNvCxnSpPr>
+            <p:nvPr/>
+          </p:nvCxnSpPr>
+          <p:spPr>
+            <a:xfrm>
+              <a:off x="2607204" y="2429071"/>
+              <a:ext cx="0" cy="950302"/>
+            </a:xfrm>
+            <a:prstGeom prst="straightConnector1">
+              <a:avLst/>
+            </a:prstGeom>
+            <a:ln>
+              <a:tailEnd type="triangle"/>
+            </a:ln>
+          </p:spPr>
+          <p:style>
+            <a:lnRef idx="1">
+              <a:schemeClr val="accent1"/>
+            </a:lnRef>
+            <a:fillRef idx="0">
+              <a:schemeClr val="accent1"/>
+            </a:fillRef>
+            <a:effectRef idx="0">
+              <a:schemeClr val="accent1"/>
+            </a:effectRef>
+            <a:fontRef idx="minor">
+              <a:schemeClr val="tx1"/>
+            </a:fontRef>
+          </p:style>
+        </p:cxnSp>
+        <p:cxnSp>
+          <p:nvCxnSpPr>
+            <p:cNvPr id="96" name="Straight Arrow Connector 95">
+              <a:extLst>
+                <a:ext uri="{FF2B5EF4-FFF2-40B4-BE49-F238E27FC236}">
+                  <a16:creationId xmlns:a16="http://schemas.microsoft.com/office/drawing/2014/main" id="{13D49494-2157-464F-AEED-22C1EAF4B4A6}"/>
+                </a:ext>
+              </a:extLst>
+            </p:cNvPr>
+            <p:cNvCxnSpPr>
+              <a:endCxn id="93" idx="0"/>
+            </p:cNvCxnSpPr>
+            <p:nvPr/>
+          </p:nvCxnSpPr>
+          <p:spPr>
+            <a:xfrm>
+              <a:off x="2607204" y="2429071"/>
+              <a:ext cx="1529274" cy="950302"/>
+            </a:xfrm>
+            <a:prstGeom prst="straightConnector1">
+              <a:avLst/>
+            </a:prstGeom>
+            <a:ln>
+              <a:tailEnd type="triangle"/>
+            </a:ln>
+          </p:spPr>
+          <p:style>
+            <a:lnRef idx="1">
+              <a:schemeClr val="accent1"/>
+            </a:lnRef>
+            <a:fillRef idx="0">
+              <a:schemeClr val="accent1"/>
+            </a:fillRef>
+            <a:effectRef idx="0">
+              <a:schemeClr val="accent1"/>
+            </a:effectRef>
+            <a:fontRef idx="minor">
+              <a:schemeClr val="tx1"/>
+            </a:fontRef>
+          </p:style>
+        </p:cxnSp>
+      </p:grpSp>
     </p:spTree>
     <p:extLst>
       <p:ext uri="{BB962C8B-B14F-4D97-AF65-F5344CB8AC3E}">

</xml_diff>